<commit_message>
Fix 3220 E1 review slides
</commit_message>
<xml_diff>
--- a/eece3220/lectures/eece.3220_lec13_exam1_preview.pptx
+++ b/eece3220/lectures/eece.3220_lec13_exam1_preview.pptx
@@ -196,7 +196,7 @@
 <file path=ppt/revisionInfo.xml><?xml version="1.0" encoding="utf-8"?>
 <p1510:revInfo xmlns:a="http://schemas.openxmlformats.org/drawingml/2006/main" xmlns:r="http://schemas.openxmlformats.org/officeDocument/2006/relationships" xmlns:p1510="http://schemas.microsoft.com/office/powerpoint/2015/10/main">
   <p1510:revLst>
-    <p1510:client id="{5067D7A3-0424-401A-A3C4-E44869E39B90}" v="10" dt="2019-10-02T12:57:06.920"/>
+    <p1510:client id="{5067D7A3-0424-401A-A3C4-E44869E39B90}" v="13" dt="2019-10-02T14:56:58.427"/>
   </p1510:revLst>
 </p1510:revInfo>
 </file>
@@ -205,8 +205,8 @@
 <pc:chgInfo xmlns:a="http://schemas.openxmlformats.org/drawingml/2006/main" xmlns:r="http://schemas.openxmlformats.org/officeDocument/2006/relationships" xmlns:ac="http://schemas.microsoft.com/office/drawing/2013/main/command" xmlns:pc="http://schemas.microsoft.com/office/powerpoint/2013/main/command">
   <pc:docChgLst>
     <pc:chgData name="Geiger, Michael J" userId="13cae92b-b37c-450b-a449-82fcae19569d" providerId="ADAL" clId="{5067D7A3-0424-401A-A3C4-E44869E39B90}"/>
-    <pc:docChg chg="custSel addSld delSld modSld">
-      <pc:chgData name="Geiger, Michael J" userId="13cae92b-b37c-450b-a449-82fcae19569d" providerId="ADAL" clId="{5067D7A3-0424-401A-A3C4-E44869E39B90}" dt="2019-10-02T13:01:55.753" v="696" actId="115"/>
+    <pc:docChg chg="undo custSel addSld delSld modSld">
+      <pc:chgData name="Geiger, Michael J" userId="13cae92b-b37c-450b-a449-82fcae19569d" providerId="ADAL" clId="{5067D7A3-0424-401A-A3C4-E44869E39B90}" dt="2019-10-02T14:57:10.232" v="882" actId="2711"/>
       <pc:docMkLst>
         <pc:docMk/>
       </pc:docMkLst>
@@ -237,6 +237,21 @@
             <pc:docMk/>
             <pc:sldMk cId="0" sldId="257"/>
             <ac:spMk id="4099" creationId="{00000000-0000-0000-0000-000000000000}"/>
+          </ac:spMkLst>
+        </pc:spChg>
+      </pc:sldChg>
+      <pc:sldChg chg="modSp">
+        <pc:chgData name="Geiger, Michael J" userId="13cae92b-b37c-450b-a449-82fcae19569d" providerId="ADAL" clId="{5067D7A3-0424-401A-A3C4-E44869E39B90}" dt="2019-10-02T14:55:39.984" v="734"/>
+        <pc:sldMkLst>
+          <pc:docMk/>
+          <pc:sldMk cId="0" sldId="385"/>
+        </pc:sldMkLst>
+        <pc:spChg chg="mod">
+          <ac:chgData name="Geiger, Michael J" userId="13cae92b-b37c-450b-a449-82fcae19569d" providerId="ADAL" clId="{5067D7A3-0424-401A-A3C4-E44869E39B90}" dt="2019-10-02T14:55:39.984" v="734"/>
+          <ac:spMkLst>
+            <pc:docMk/>
+            <pc:sldMk cId="0" sldId="385"/>
+            <ac:spMk id="25603" creationId="{00000000-0000-0000-0000-000000000000}"/>
           </ac:spMkLst>
         </pc:spChg>
       </pc:sldChg>
@@ -300,6 +315,21 @@
         </pc:spChg>
       </pc:sldChg>
       <pc:sldChg chg="modSp">
+        <pc:chgData name="Geiger, Michael J" userId="13cae92b-b37c-450b-a449-82fcae19569d" providerId="ADAL" clId="{5067D7A3-0424-401A-A3C4-E44869E39B90}" dt="2019-10-02T14:13:47.847" v="733" actId="20577"/>
+        <pc:sldMkLst>
+          <pc:docMk/>
+          <pc:sldMk cId="3585894709" sldId="482"/>
+        </pc:sldMkLst>
+        <pc:spChg chg="mod">
+          <ac:chgData name="Geiger, Michael J" userId="13cae92b-b37c-450b-a449-82fcae19569d" providerId="ADAL" clId="{5067D7A3-0424-401A-A3C4-E44869E39B90}" dt="2019-10-02T14:13:47.847" v="733" actId="20577"/>
+          <ac:spMkLst>
+            <pc:docMk/>
+            <pc:sldMk cId="3585894709" sldId="482"/>
+            <ac:spMk id="21507" creationId="{00000000-0000-0000-0000-000000000000}"/>
+          </ac:spMkLst>
+        </pc:spChg>
+      </pc:sldChg>
+      <pc:sldChg chg="modSp">
         <pc:chgData name="Geiger, Michael J" userId="13cae92b-b37c-450b-a449-82fcae19569d" providerId="ADAL" clId="{5067D7A3-0424-401A-A3C4-E44869E39B90}" dt="2019-10-02T13:01:29.795" v="695" actId="20577"/>
         <pc:sldMkLst>
           <pc:docMk/>
@@ -315,13 +345,13 @@
         </pc:spChg>
       </pc:sldChg>
       <pc:sldChg chg="modSp">
-        <pc:chgData name="Geiger, Michael J" userId="13cae92b-b37c-450b-a449-82fcae19569d" providerId="ADAL" clId="{5067D7A3-0424-401A-A3C4-E44869E39B90}" dt="2019-10-02T12:57:46.175" v="634" actId="20577"/>
+        <pc:chgData name="Geiger, Michael J" userId="13cae92b-b37c-450b-a449-82fcae19569d" providerId="ADAL" clId="{5067D7A3-0424-401A-A3C4-E44869E39B90}" dt="2019-10-02T14:04:49.806" v="698" actId="20577"/>
         <pc:sldMkLst>
           <pc:docMk/>
           <pc:sldMk cId="1229587195" sldId="486"/>
         </pc:sldMkLst>
         <pc:spChg chg="mod">
-          <ac:chgData name="Geiger, Michael J" userId="13cae92b-b37c-450b-a449-82fcae19569d" providerId="ADAL" clId="{5067D7A3-0424-401A-A3C4-E44869E39B90}" dt="2019-10-02T12:57:46.175" v="634" actId="20577"/>
+          <ac:chgData name="Geiger, Michael J" userId="13cae92b-b37c-450b-a449-82fcae19569d" providerId="ADAL" clId="{5067D7A3-0424-401A-A3C4-E44869E39B90}" dt="2019-10-02T14:04:49.806" v="698" actId="20577"/>
           <ac:spMkLst>
             <pc:docMk/>
             <pc:sldMk cId="1229587195" sldId="486"/>
@@ -421,7 +451,7 @@
         </pc:spChg>
       </pc:sldChg>
       <pc:sldChg chg="modSp add">
-        <pc:chgData name="Geiger, Michael J" userId="13cae92b-b37c-450b-a449-82fcae19569d" providerId="ADAL" clId="{5067D7A3-0424-401A-A3C4-E44869E39B90}" dt="2019-10-02T12:57:12.692" v="612" actId="20577"/>
+        <pc:chgData name="Geiger, Michael J" userId="13cae92b-b37c-450b-a449-82fcae19569d" providerId="ADAL" clId="{5067D7A3-0424-401A-A3C4-E44869E39B90}" dt="2019-10-02T14:57:10.232" v="882" actId="2711"/>
         <pc:sldMkLst>
           <pc:docMk/>
           <pc:sldMk cId="1656045872" sldId="528"/>
@@ -432,6 +462,14 @@
             <pc:docMk/>
             <pc:sldMk cId="1656045872" sldId="528"/>
             <ac:spMk id="2" creationId="{5290570A-2294-4BF4-940A-65DD476470EE}"/>
+          </ac:spMkLst>
+        </pc:spChg>
+        <pc:spChg chg="mod">
+          <ac:chgData name="Geiger, Michael J" userId="13cae92b-b37c-450b-a449-82fcae19569d" providerId="ADAL" clId="{5067D7A3-0424-401A-A3C4-E44869E39B90}" dt="2019-10-02T14:57:10.232" v="882" actId="2711"/>
+          <ac:spMkLst>
+            <pc:docMk/>
+            <pc:sldMk cId="1656045872" sldId="528"/>
+            <ac:spMk id="3" creationId="{1A37C3E8-557A-47A5-B34A-B78B5B990A9E}"/>
           </ac:spMkLst>
         </pc:spChg>
       </pc:sldChg>
@@ -11328,7 +11366,149 @@
           <a:bodyPr/>
           <a:lstStyle/>
           <a:p>
-            <a:endParaRPr lang="en-US"/>
+            <a:r>
+              <a:rPr lang="en-US" dirty="0"/>
+              <a:t>Loop to visit all elements of vector</a:t>
+            </a:r>
+            <a:br>
+              <a:rPr lang="en-US" dirty="0"/>
+            </a:br>
+            <a:r>
+              <a:rPr lang="en-US" dirty="0">
+                <a:latin typeface="Courier New" panose="02070309020205020404" pitchFamily="49" charset="0"/>
+                <a:cs typeface="Courier New" panose="02070309020205020404" pitchFamily="49" charset="0"/>
+              </a:rPr>
+              <a:t>for (int </a:t>
+            </a:r>
+            <a:r>
+              <a:rPr lang="en-US" dirty="0" err="1">
+                <a:latin typeface="Courier New" panose="02070309020205020404" pitchFamily="49" charset="0"/>
+                <a:cs typeface="Courier New" panose="02070309020205020404" pitchFamily="49" charset="0"/>
+              </a:rPr>
+              <a:t>val</a:t>
+            </a:r>
+            <a:r>
+              <a:rPr lang="en-US" dirty="0">
+                <a:latin typeface="Courier New" panose="02070309020205020404" pitchFamily="49" charset="0"/>
+                <a:cs typeface="Courier New" panose="02070309020205020404" pitchFamily="49" charset="0"/>
+              </a:rPr>
+              <a:t> : vec3)</a:t>
+            </a:r>
+            <a:br>
+              <a:rPr lang="en-US" dirty="0">
+                <a:latin typeface="Courier New" panose="02070309020205020404" pitchFamily="49" charset="0"/>
+                <a:cs typeface="Courier New" panose="02070309020205020404" pitchFamily="49" charset="0"/>
+              </a:rPr>
+            </a:br>
+            <a:r>
+              <a:rPr lang="en-US" dirty="0">
+                <a:latin typeface="Courier New" panose="02070309020205020404" pitchFamily="49" charset="0"/>
+                <a:cs typeface="Courier New" panose="02070309020205020404" pitchFamily="49" charset="0"/>
+              </a:rPr>
+              <a:t>	</a:t>
+            </a:r>
+            <a:r>
+              <a:rPr lang="en-US" dirty="0" err="1">
+                <a:latin typeface="Courier New" panose="02070309020205020404" pitchFamily="49" charset="0"/>
+                <a:cs typeface="Courier New" panose="02070309020205020404" pitchFamily="49" charset="0"/>
+              </a:rPr>
+              <a:t>cout</a:t>
+            </a:r>
+            <a:r>
+              <a:rPr lang="en-US" dirty="0">
+                <a:latin typeface="Courier New" panose="02070309020205020404" pitchFamily="49" charset="0"/>
+                <a:cs typeface="Courier New" panose="02070309020205020404" pitchFamily="49" charset="0"/>
+              </a:rPr>
+              <a:t> &lt;&lt; </a:t>
+            </a:r>
+            <a:r>
+              <a:rPr lang="en-US" dirty="0" err="1">
+                <a:latin typeface="Courier New" panose="02070309020205020404" pitchFamily="49" charset="0"/>
+                <a:cs typeface="Courier New" panose="02070309020205020404" pitchFamily="49" charset="0"/>
+              </a:rPr>
+              <a:t>val</a:t>
+            </a:r>
+            <a:r>
+              <a:rPr lang="en-US" dirty="0">
+                <a:latin typeface="Courier New" panose="02070309020205020404" pitchFamily="49" charset="0"/>
+                <a:cs typeface="Courier New" panose="02070309020205020404" pitchFamily="49" charset="0"/>
+              </a:rPr>
+              <a:t> &lt;&lt; ' ';</a:t>
+            </a:r>
+          </a:p>
+          <a:p>
+            <a:endParaRPr lang="en-US" dirty="0"/>
+          </a:p>
+          <a:p>
+            <a:r>
+              <a:rPr lang="en-US" dirty="0"/>
+              <a:t>Could write type-independent loop using auto keyword:</a:t>
+            </a:r>
+            <a:br>
+              <a:rPr lang="en-US" dirty="0"/>
+            </a:br>
+            <a:r>
+              <a:rPr lang="en-US" dirty="0">
+                <a:latin typeface="Courier New" panose="02070309020205020404" pitchFamily="49" charset="0"/>
+                <a:cs typeface="Courier New" panose="02070309020205020404" pitchFamily="49" charset="0"/>
+              </a:rPr>
+              <a:t>for (auto </a:t>
+            </a:r>
+            <a:r>
+              <a:rPr lang="en-US" dirty="0" err="1">
+                <a:latin typeface="Courier New" panose="02070309020205020404" pitchFamily="49" charset="0"/>
+                <a:cs typeface="Courier New" panose="02070309020205020404" pitchFamily="49" charset="0"/>
+              </a:rPr>
+              <a:t>ch</a:t>
+            </a:r>
+            <a:r>
+              <a:rPr lang="en-US" dirty="0">
+                <a:latin typeface="Courier New" panose="02070309020205020404" pitchFamily="49" charset="0"/>
+                <a:cs typeface="Courier New" panose="02070309020205020404" pitchFamily="49" charset="0"/>
+              </a:rPr>
+              <a:t> : vec4)</a:t>
+            </a:r>
+            <a:br>
+              <a:rPr lang="en-US" dirty="0">
+                <a:latin typeface="Courier New" panose="02070309020205020404" pitchFamily="49" charset="0"/>
+                <a:cs typeface="Courier New" panose="02070309020205020404" pitchFamily="49" charset="0"/>
+              </a:rPr>
+            </a:br>
+            <a:r>
+              <a:rPr lang="en-US" dirty="0">
+                <a:latin typeface="Courier New" panose="02070309020205020404" pitchFamily="49" charset="0"/>
+                <a:cs typeface="Courier New" panose="02070309020205020404" pitchFamily="49" charset="0"/>
+              </a:rPr>
+              <a:t>	</a:t>
+            </a:r>
+            <a:r>
+              <a:rPr lang="en-US" dirty="0" err="1">
+                <a:latin typeface="Courier New" panose="02070309020205020404" pitchFamily="49" charset="0"/>
+                <a:cs typeface="Courier New" panose="02070309020205020404" pitchFamily="49" charset="0"/>
+              </a:rPr>
+              <a:t>cout</a:t>
+            </a:r>
+            <a:r>
+              <a:rPr lang="en-US" dirty="0">
+                <a:latin typeface="Courier New" panose="02070309020205020404" pitchFamily="49" charset="0"/>
+                <a:cs typeface="Courier New" panose="02070309020205020404" pitchFamily="49" charset="0"/>
+              </a:rPr>
+              <a:t> &lt;&lt; </a:t>
+            </a:r>
+            <a:r>
+              <a:rPr lang="en-US" dirty="0" err="1">
+                <a:latin typeface="Courier New" panose="02070309020205020404" pitchFamily="49" charset="0"/>
+                <a:cs typeface="Courier New" panose="02070309020205020404" pitchFamily="49" charset="0"/>
+              </a:rPr>
+              <a:t>ch</a:t>
+            </a:r>
+            <a:r>
+              <a:rPr lang="en-US" dirty="0">
+                <a:latin typeface="Courier New" panose="02070309020205020404" pitchFamily="49" charset="0"/>
+                <a:cs typeface="Courier New" panose="02070309020205020404" pitchFamily="49" charset="0"/>
+              </a:rPr>
+              <a:t>;</a:t>
+            </a:r>
           </a:p>
         </p:txBody>
       </p:sp>
@@ -11511,14 +11691,7 @@
             <a:pPr lvl="1"/>
             <a:r>
               <a:rPr lang="en-US" dirty="0"/>
-              <a:t>Late HW 1 submissions due by end of day</a:t>
-            </a:r>
-          </a:p>
-          <a:p>
-            <a:pPr lvl="2"/>
-            <a:r>
-              <a:rPr lang="en-US" dirty="0"/>
-              <a:t>Solution to be posted Saturday morning</a:t>
+              <a:t>HW 1 solution on course schedule page</a:t>
             </a:r>
           </a:p>
           <a:p>
@@ -11532,7 +11705,7 @@
             <a:pPr lvl="1"/>
             <a:r>
               <a:rPr lang="en-US" dirty="0"/>
-              <a:t>Exam 1: Monday, 2/25, 3-5 PM, Ball 214</a:t>
+              <a:t>Exam 1: Thursday, 10/3, 2-4 PM, Ball 328</a:t>
             </a:r>
           </a:p>
           <a:p>
@@ -12016,7 +12189,7 @@
               <a:rPr lang="en-US" sz="2200" dirty="0">
                 <a:latin typeface="Arial" charset="0"/>
               </a:rPr>
-              <a:t>We’ll start at 3:00—</a:t>
+              <a:t>We’ll start at 2:00—</a:t>
             </a:r>
             <a:r>
               <a:rPr lang="en-US" sz="2200" b="1" u="sng" dirty="0">
@@ -13517,8 +13690,35 @@
               <a:rPr lang="en-US" dirty="0">
                 <a:latin typeface="Arial" charset="0"/>
               </a:rPr>
-              <a:t>: change number of digits displayed to the right of the decimal point</a:t>
-            </a:r>
+              <a:t>: change number of digits displayed to the right of the decimal point </a:t>
+            </a:r>
+            <a:r>
+              <a:rPr lang="en-US" i="1" dirty="0">
+                <a:latin typeface="Arial" charset="0"/>
+              </a:rPr>
+              <a:t>(</a:t>
+            </a:r>
+            <a:r>
+              <a:rPr lang="en-US" i="1" u="sng" dirty="0">
+                <a:latin typeface="Arial" charset="0"/>
+              </a:rPr>
+              <a:t>if</a:t>
+            </a:r>
+            <a:r>
+              <a:rPr lang="en-US" i="1" dirty="0">
+                <a:latin typeface="Arial" charset="0"/>
+              </a:rPr>
+              <a:t> </a:t>
+            </a:r>
+            <a:r>
+              <a:rPr lang="en-US" i="1">
+                <a:latin typeface="Arial" charset="0"/>
+              </a:rPr>
+              <a:t>you’re using fixed format)</a:t>
+            </a:r>
+            <a:endParaRPr lang="en-US" dirty="0">
+              <a:latin typeface="Arial" charset="0"/>
+            </a:endParaRPr>
           </a:p>
           <a:p>
             <a:pPr eaLnBrk="1" hangingPunct="1"/>

</xml_diff>